<commit_message>
Fixed spelling in 5510 video06
</commit_message>
<xml_diff>
--- a/clinical-research-methodology/results/video05-quasi-experiments.pptx
+++ b/clinical-research-methodology/results/video05-quasi-experiments.pptx
@@ -1,6 +1,6 @@
 
 <file path=ppt/presentation.xml><?xml version="1.0" encoding="utf-8"?>
-<p:presentation xmlns:a="http://schemas.openxmlformats.org/drawingml/2006/main" xmlns:r="http://schemas.openxmlformats.org/officeDocument/2006/relationships" xmlns:p="http://schemas.openxmlformats.org/presentationml/2006/main" saveSubsetFonts="1" autoCompressPictures="0">
+<p:presentation xmlns:a="http://schemas.openxmlformats.org/drawingml/2006/main" xmlns:p="http://schemas.openxmlformats.org/presentationml/2006/main" xmlns:r="http://schemas.openxmlformats.org/officeDocument/2006/relationships" autoCompressPictures="0" saveSubsetFonts="1">
   <p:sldMasterIdLst>
     <p:sldMasterId id="2147483648" r:id="rId1"/>
   </p:sldMasterIdLst>
@@ -57,8 +57,8 @@
     <a:defPPr>
       <a:defRPr lang="en-US"/>
     </a:defPPr>
-    <a:lvl1pPr marL="0" algn="l" defTabSz="457200" rtl="0" eaLnBrk="1" latinLnBrk="0" hangingPunct="1">
-      <a:defRPr sz="1800" kern="1200">
+    <a:lvl1pPr algn="l" defTabSz="457200" eaLnBrk="1" hangingPunct="1" latinLnBrk="0" marL="0" rtl="0">
+      <a:defRPr kern="1200" sz="1800">
         <a:solidFill>
           <a:schemeClr val="tx1"/>
         </a:solidFill>
@@ -67,8 +67,8 @@
         <a:cs typeface="+mn-cs"/>
       </a:defRPr>
     </a:lvl1pPr>
-    <a:lvl2pPr marL="457200" algn="l" defTabSz="457200" rtl="0" eaLnBrk="1" latinLnBrk="0" hangingPunct="1">
-      <a:defRPr sz="1800" kern="1200">
+    <a:lvl2pPr algn="l" defTabSz="457200" eaLnBrk="1" hangingPunct="1" latinLnBrk="0" marL="457200" rtl="0">
+      <a:defRPr kern="1200" sz="1800">
         <a:solidFill>
           <a:schemeClr val="tx1"/>
         </a:solidFill>
@@ -77,8 +77,8 @@
         <a:cs typeface="+mn-cs"/>
       </a:defRPr>
     </a:lvl2pPr>
-    <a:lvl3pPr marL="914400" algn="l" defTabSz="457200" rtl="0" eaLnBrk="1" latinLnBrk="0" hangingPunct="1">
-      <a:defRPr sz="1800" kern="1200">
+    <a:lvl3pPr algn="l" defTabSz="457200" eaLnBrk="1" hangingPunct="1" latinLnBrk="0" marL="914400" rtl="0">
+      <a:defRPr kern="1200" sz="1800">
         <a:solidFill>
           <a:schemeClr val="tx1"/>
         </a:solidFill>
@@ -87,8 +87,8 @@
         <a:cs typeface="+mn-cs"/>
       </a:defRPr>
     </a:lvl3pPr>
-    <a:lvl4pPr marL="1371600" algn="l" defTabSz="457200" rtl="0" eaLnBrk="1" latinLnBrk="0" hangingPunct="1">
-      <a:defRPr sz="1800" kern="1200">
+    <a:lvl4pPr algn="l" defTabSz="457200" eaLnBrk="1" hangingPunct="1" latinLnBrk="0" marL="1371600" rtl="0">
+      <a:defRPr kern="1200" sz="1800">
         <a:solidFill>
           <a:schemeClr val="tx1"/>
         </a:solidFill>
@@ -97,8 +97,8 @@
         <a:cs typeface="+mn-cs"/>
       </a:defRPr>
     </a:lvl4pPr>
-    <a:lvl5pPr marL="1828800" algn="l" defTabSz="457200" rtl="0" eaLnBrk="1" latinLnBrk="0" hangingPunct="1">
-      <a:defRPr sz="1800" kern="1200">
+    <a:lvl5pPr algn="l" defTabSz="457200" eaLnBrk="1" hangingPunct="1" latinLnBrk="0" marL="1828800" rtl="0">
+      <a:defRPr kern="1200" sz="1800">
         <a:solidFill>
           <a:schemeClr val="tx1"/>
         </a:solidFill>
@@ -107,8 +107,8 @@
         <a:cs typeface="+mn-cs"/>
       </a:defRPr>
     </a:lvl5pPr>
-    <a:lvl6pPr marL="2286000" algn="l" defTabSz="457200" rtl="0" eaLnBrk="1" latinLnBrk="0" hangingPunct="1">
-      <a:defRPr sz="1800" kern="1200">
+    <a:lvl6pPr algn="l" defTabSz="457200" eaLnBrk="1" hangingPunct="1" latinLnBrk="0" marL="2286000" rtl="0">
+      <a:defRPr kern="1200" sz="1800">
         <a:solidFill>
           <a:schemeClr val="tx1"/>
         </a:solidFill>
@@ -117,8 +117,8 @@
         <a:cs typeface="+mn-cs"/>
       </a:defRPr>
     </a:lvl6pPr>
-    <a:lvl7pPr marL="2743200" algn="l" defTabSz="457200" rtl="0" eaLnBrk="1" latinLnBrk="0" hangingPunct="1">
-      <a:defRPr sz="1800" kern="1200">
+    <a:lvl7pPr algn="l" defTabSz="457200" eaLnBrk="1" hangingPunct="1" latinLnBrk="0" marL="2743200" rtl="0">
+      <a:defRPr kern="1200" sz="1800">
         <a:solidFill>
           <a:schemeClr val="tx1"/>
         </a:solidFill>
@@ -127,8 +127,8 @@
         <a:cs typeface="+mn-cs"/>
       </a:defRPr>
     </a:lvl7pPr>
-    <a:lvl8pPr marL="3200400" algn="l" defTabSz="457200" rtl="0" eaLnBrk="1" latinLnBrk="0" hangingPunct="1">
-      <a:defRPr sz="1800" kern="1200">
+    <a:lvl8pPr algn="l" defTabSz="457200" eaLnBrk="1" hangingPunct="1" latinLnBrk="0" marL="3200400" rtl="0">
+      <a:defRPr kern="1200" sz="1800">
         <a:solidFill>
           <a:schemeClr val="tx1"/>
         </a:solidFill>
@@ -137,8 +137,8 @@
         <a:cs typeface="+mn-cs"/>
       </a:defRPr>
     </a:lvl8pPr>
-    <a:lvl9pPr marL="3657600" algn="l" defTabSz="457200" rtl="0" eaLnBrk="1" latinLnBrk="0" hangingPunct="1">
-      <a:defRPr sz="1800" kern="1200">
+    <a:lvl9pPr algn="l" defTabSz="457200" eaLnBrk="1" hangingPunct="1" latinLnBrk="0" marL="3657600" rtl="0">
+      <a:defRPr kern="1200" sz="1800">
         <a:solidFill>
           <a:schemeClr val="tx1"/>
         </a:solidFill>
@@ -249,7 +249,7 @@
           <a:p>
             <a:fld id="{0F9C1CCF-B725-44A7-AA57-5E433BD85C9F}" type="datetimeFigureOut">
               <a:rPr lang="en-US" smtClean="0"/>
-              <a:t>12/30/2018</a:t>
+              <a:t>4/5/2019</a:t>
             </a:fld>
             <a:endParaRPr lang="en-US"/>
           </a:p>
@@ -313,37 +313,38 @@
           <a:p>
             <a:pPr lvl="0"/>
             <a:r>
-              <a:rPr lang="en-US"/>
+              <a:rPr lang="en-US" smtClean="0"/>
               <a:t>Click to edit Master text styles</a:t>
             </a:r>
           </a:p>
           <a:p>
             <a:pPr lvl="1"/>
             <a:r>
-              <a:rPr lang="en-US"/>
+              <a:rPr lang="en-US" smtClean="0"/>
               <a:t>Second level</a:t>
             </a:r>
           </a:p>
           <a:p>
             <a:pPr lvl="2"/>
             <a:r>
-              <a:rPr lang="en-US"/>
+              <a:rPr lang="en-US" smtClean="0"/>
               <a:t>Third level</a:t>
             </a:r>
           </a:p>
           <a:p>
             <a:pPr lvl="3"/>
             <a:r>
-              <a:rPr lang="en-US"/>
+              <a:rPr lang="en-US" smtClean="0"/>
               <a:t>Fourth level</a:t>
             </a:r>
           </a:p>
           <a:p>
             <a:pPr lvl="4"/>
             <a:r>
-              <a:rPr lang="en-US"/>
+              <a:rPr lang="en-US" smtClean="0"/>
               <a:t>Fifth level</a:t>
             </a:r>
+            <a:endParaRPr lang="en-US"/>
           </a:p>
         </p:txBody>
       </p:sp>
@@ -789,7 +790,7 @@
             </a:r>
             <a:r>
               <a:rPr/>
-              <a:t>Althought</a:t>
+              <a:t>Although</a:t>
             </a:r>
             <a:r>
               <a:rPr/>
@@ -8217,7 +8218,7 @@
             </a:r>
             <a:r>
               <a:rPr/>
-              <a:t>strenuosly</a:t>
+              <a:t>strenuously</a:t>
             </a:r>
             <a:r>
               <a:rPr/>
@@ -11253,7 +11254,7 @@
             </a:r>
             <a:r>
               <a:rPr/>
-              <a:t>soemtimes</a:t>
+              <a:t>sometimes</a:t>
             </a:r>
             <a:r>
               <a:rPr/>
@@ -15515,7 +15516,7 @@
             </a:r>
             <a:r>
               <a:rPr/>
-              <a:t>occured</a:t>
+              <a:t>occurred</a:t>
             </a:r>
             <a:r>
               <a:rPr/>
@@ -19603,7 +19604,7 @@
             </a:r>
             <a:r>
               <a:rPr/>
-              <a:t>occuring</a:t>
+              <a:t>occurring</a:t>
             </a:r>
             <a:r>
               <a:rPr/>
@@ -22127,7 +22128,7 @@
             </a:r>
             <a:r>
               <a:rPr/>
-              <a:t>withdrwal</a:t>
+              <a:t>withdrawal</a:t>
             </a:r>
             <a:r>
               <a:rPr/>
@@ -22549,7 +22550,7 @@
             </a:r>
             <a:r>
               <a:rPr/>
-              <a:t>beneifts</a:t>
+              <a:t>benefits</a:t>
             </a:r>
             <a:r>
               <a:rPr/>
@@ -22877,7 +22878,7 @@
             </a:r>
             <a:r>
               <a:rPr/>
-              <a:t>plently</a:t>
+              <a:t>plenty</a:t>
             </a:r>
             <a:r>
               <a:rPr/>
@@ -25731,7 +25732,7 @@
             </a:r>
             <a:r>
               <a:rPr/>
-              <a:t>Helathcare</a:t>
+              <a:t>Healthcare</a:t>
             </a:r>
             <a:r>
               <a:rPr/>
@@ -26253,7 +26254,7 @@
             </a:r>
             <a:r>
               <a:rPr/>
-              <a:t>persepctive.</a:t>
+              <a:t>perspective.</a:t>
             </a:r>
             <a:r>
               <a:rPr/>
@@ -27287,7 +27288,7 @@
             </a:r>
             <a:r>
               <a:rPr/>
-              <a:t>ateempts</a:t>
+              <a:t>attempts</a:t>
             </a:r>
             <a:r>
               <a:rPr/>
@@ -27543,7 +27544,7 @@
             </a:r>
             <a:r>
               <a:rPr/>
-              <a:t>processs</a:t>
+              <a:t>process</a:t>
             </a:r>
             <a:r>
               <a:rPr/>
@@ -29313,7 +29314,7 @@
             </a:r>
             <a:r>
               <a:rPr/>
-              <a:t>obective</a:t>
+              <a:t>objective</a:t>
             </a:r>
             <a:r>
               <a:rPr/>
@@ -31193,7 +31194,7 @@
             </a:r>
             <a:r>
               <a:rPr/>
-              <a:t>Oucome</a:t>
+              <a:t>Outcome</a:t>
             </a:r>
             <a:r>
               <a:rPr/>
@@ -32619,7 +32620,7 @@
             </a:r>
             <a:r>
               <a:rPr/>
-              <a:t>influece</a:t>
+              <a:t>influence</a:t>
             </a:r>
             <a:r>
               <a:rPr/>
@@ -32635,7 +32636,7 @@
             </a:r>
             <a:r>
               <a:rPr/>
-              <a:t>outdome</a:t>
+              <a:t>outcome</a:t>
             </a:r>
             <a:r>
               <a:rPr/>
@@ -34206,9 +34207,10 @@
           <a:lstStyle/>
           <a:p>
             <a:r>
-              <a:rPr lang="en-US"/>
+              <a:rPr lang="en-US" smtClean="0"/>
               <a:t>Click to edit Master title style</a:t>
             </a:r>
+            <a:endParaRPr lang="en-US"/>
           </a:p>
         </p:txBody>
       </p:sp>
@@ -34324,9 +34326,10 @@
           </a:lstStyle>
           <a:p>
             <a:r>
-              <a:rPr lang="en-US"/>
+              <a:rPr lang="en-US" smtClean="0"/>
               <a:t>Click to edit Master subtitle style</a:t>
             </a:r>
+            <a:endParaRPr lang="en-US"/>
           </a:p>
         </p:txBody>
       </p:sp>
@@ -34347,7 +34350,7 @@
           <a:p>
             <a:fld id="{241EB5C9-1307-BA42-ABA2-0BC069CD8E7F}" type="datetimeFigureOut">
               <a:rPr lang="en-US" smtClean="0"/>
-              <a:t>12/30/2018</a:t>
+              <a:t>4/5/2019</a:t>
             </a:fld>
             <a:endParaRPr lang="en-US"/>
           </a:p>
@@ -34441,9 +34444,10 @@
           <a:lstStyle/>
           <a:p>
             <a:r>
-              <a:rPr lang="en-US"/>
+              <a:rPr lang="en-US" smtClean="0"/>
               <a:t>Click to edit Master title style</a:t>
             </a:r>
+            <a:endParaRPr lang="en-US"/>
           </a:p>
         </p:txBody>
       </p:sp>
@@ -34464,37 +34468,38 @@
           <a:p>
             <a:pPr lvl="0"/>
             <a:r>
-              <a:rPr lang="en-US"/>
+              <a:rPr lang="en-US" smtClean="0"/>
               <a:t>Click to edit Master text styles</a:t>
             </a:r>
           </a:p>
           <a:p>
             <a:pPr lvl="1"/>
             <a:r>
-              <a:rPr lang="en-US"/>
+              <a:rPr lang="en-US" smtClean="0"/>
               <a:t>Second level</a:t>
             </a:r>
           </a:p>
           <a:p>
             <a:pPr lvl="2"/>
             <a:r>
-              <a:rPr lang="en-US"/>
+              <a:rPr lang="en-US" smtClean="0"/>
               <a:t>Third level</a:t>
             </a:r>
           </a:p>
           <a:p>
             <a:pPr lvl="3"/>
             <a:r>
-              <a:rPr lang="en-US"/>
+              <a:rPr lang="en-US" smtClean="0"/>
               <a:t>Fourth level</a:t>
             </a:r>
           </a:p>
           <a:p>
             <a:pPr lvl="4"/>
             <a:r>
-              <a:rPr lang="en-US"/>
+              <a:rPr lang="en-US" smtClean="0"/>
               <a:t>Fifth level</a:t>
             </a:r>
+            <a:endParaRPr lang="en-US"/>
           </a:p>
         </p:txBody>
       </p:sp>
@@ -34515,7 +34520,7 @@
           <a:p>
             <a:fld id="{241EB5C9-1307-BA42-ABA2-0BC069CD8E7F}" type="datetimeFigureOut">
               <a:rPr lang="en-US" smtClean="0"/>
-              <a:t>12/30/2018</a:t>
+              <a:t>4/5/2019</a:t>
             </a:fld>
             <a:endParaRPr lang="en-US"/>
           </a:p>
@@ -34614,9 +34619,10 @@
           <a:lstStyle/>
           <a:p>
             <a:r>
-              <a:rPr lang="en-US"/>
+              <a:rPr lang="en-US" smtClean="0"/>
               <a:t>Click to edit Master title style</a:t>
             </a:r>
+            <a:endParaRPr lang="en-US"/>
           </a:p>
         </p:txBody>
       </p:sp>
@@ -34642,37 +34648,38 @@
           <a:p>
             <a:pPr lvl="0"/>
             <a:r>
-              <a:rPr lang="en-US"/>
+              <a:rPr lang="en-US" smtClean="0"/>
               <a:t>Click to edit Master text styles</a:t>
             </a:r>
           </a:p>
           <a:p>
             <a:pPr lvl="1"/>
             <a:r>
-              <a:rPr lang="en-US"/>
+              <a:rPr lang="en-US" smtClean="0"/>
               <a:t>Second level</a:t>
             </a:r>
           </a:p>
           <a:p>
             <a:pPr lvl="2"/>
             <a:r>
-              <a:rPr lang="en-US"/>
+              <a:rPr lang="en-US" smtClean="0"/>
               <a:t>Third level</a:t>
             </a:r>
           </a:p>
           <a:p>
             <a:pPr lvl="3"/>
             <a:r>
-              <a:rPr lang="en-US"/>
+              <a:rPr lang="en-US" smtClean="0"/>
               <a:t>Fourth level</a:t>
             </a:r>
           </a:p>
           <a:p>
             <a:pPr lvl="4"/>
             <a:r>
-              <a:rPr lang="en-US"/>
+              <a:rPr lang="en-US" smtClean="0"/>
               <a:t>Fifth level</a:t>
             </a:r>
+            <a:endParaRPr lang="en-US"/>
           </a:p>
         </p:txBody>
       </p:sp>
@@ -34693,7 +34700,7 @@
           <a:p>
             <a:fld id="{241EB5C9-1307-BA42-ABA2-0BC069CD8E7F}" type="datetimeFigureOut">
               <a:rPr lang="en-US" smtClean="0"/>
-              <a:t>12/30/2018</a:t>
+              <a:t>4/5/2019</a:t>
             </a:fld>
             <a:endParaRPr lang="en-US"/>
           </a:p>
@@ -34787,9 +34794,10 @@
           <a:lstStyle/>
           <a:p>
             <a:r>
-              <a:rPr lang="en-US"/>
+              <a:rPr lang="en-US" smtClean="0"/>
               <a:t>Click to edit Master title style</a:t>
             </a:r>
+            <a:endParaRPr lang="en-US"/>
           </a:p>
         </p:txBody>
       </p:sp>
@@ -34810,37 +34818,38 @@
           <a:p>
             <a:pPr lvl="0"/>
             <a:r>
-              <a:rPr lang="en-US"/>
+              <a:rPr lang="en-US" smtClean="0"/>
               <a:t>Click to edit Master text styles</a:t>
             </a:r>
           </a:p>
           <a:p>
             <a:pPr lvl="1"/>
             <a:r>
-              <a:rPr lang="en-US"/>
+              <a:rPr lang="en-US" smtClean="0"/>
               <a:t>Second level</a:t>
             </a:r>
           </a:p>
           <a:p>
             <a:pPr lvl="2"/>
             <a:r>
-              <a:rPr lang="en-US"/>
+              <a:rPr lang="en-US" smtClean="0"/>
               <a:t>Third level</a:t>
             </a:r>
           </a:p>
           <a:p>
             <a:pPr lvl="3"/>
             <a:r>
-              <a:rPr lang="en-US"/>
+              <a:rPr lang="en-US" smtClean="0"/>
               <a:t>Fourth level</a:t>
             </a:r>
           </a:p>
           <a:p>
             <a:pPr lvl="4"/>
             <a:r>
-              <a:rPr lang="en-US"/>
+              <a:rPr lang="en-US" smtClean="0"/>
               <a:t>Fifth level</a:t>
             </a:r>
+            <a:endParaRPr lang="en-US"/>
           </a:p>
         </p:txBody>
       </p:sp>
@@ -34861,7 +34870,7 @@
           <a:p>
             <a:fld id="{241EB5C9-1307-BA42-ABA2-0BC069CD8E7F}" type="datetimeFigureOut">
               <a:rPr lang="en-US" smtClean="0"/>
-              <a:t>12/30/2018</a:t>
+              <a:t>4/5/2019</a:t>
             </a:fld>
             <a:endParaRPr lang="en-US"/>
           </a:p>
@@ -34964,9 +34973,10 @@
           </a:lstStyle>
           <a:p>
             <a:r>
-              <a:rPr lang="en-US"/>
+              <a:rPr lang="en-US" smtClean="0"/>
               <a:t>Click to edit Master title style</a:t>
             </a:r>
+            <a:endParaRPr lang="en-US"/>
           </a:p>
         </p:txBody>
       </p:sp>
@@ -35083,7 +35093,7 @@
           <a:p>
             <a:pPr lvl="0"/>
             <a:r>
-              <a:rPr lang="en-US"/>
+              <a:rPr lang="en-US" smtClean="0"/>
               <a:t>Click to edit Master text styles</a:t>
             </a:r>
           </a:p>
@@ -35106,7 +35116,7 @@
           <a:p>
             <a:fld id="{241EB5C9-1307-BA42-ABA2-0BC069CD8E7F}" type="datetimeFigureOut">
               <a:rPr lang="en-US" smtClean="0"/>
-              <a:t>12/30/2018</a:t>
+              <a:t>4/5/2019</a:t>
             </a:fld>
             <a:endParaRPr lang="en-US"/>
           </a:p>
@@ -35200,9 +35210,10 @@
           <a:lstStyle/>
           <a:p>
             <a:r>
-              <a:rPr lang="en-US"/>
+              <a:rPr lang="en-US" smtClean="0"/>
               <a:t>Click to edit Master title style</a:t>
             </a:r>
+            <a:endParaRPr lang="en-US"/>
           </a:p>
         </p:txBody>
       </p:sp>
@@ -35256,37 +35267,38 @@
           <a:p>
             <a:pPr lvl="0"/>
             <a:r>
-              <a:rPr lang="en-US"/>
+              <a:rPr lang="en-US" smtClean="0"/>
               <a:t>Click to edit Master text styles</a:t>
             </a:r>
           </a:p>
           <a:p>
             <a:pPr lvl="1"/>
             <a:r>
-              <a:rPr lang="en-US"/>
+              <a:rPr lang="en-US" smtClean="0"/>
               <a:t>Second level</a:t>
             </a:r>
           </a:p>
           <a:p>
             <a:pPr lvl="2"/>
             <a:r>
-              <a:rPr lang="en-US"/>
+              <a:rPr lang="en-US" smtClean="0"/>
               <a:t>Third level</a:t>
             </a:r>
           </a:p>
           <a:p>
             <a:pPr lvl="3"/>
             <a:r>
-              <a:rPr lang="en-US"/>
+              <a:rPr lang="en-US" smtClean="0"/>
               <a:t>Fourth level</a:t>
             </a:r>
           </a:p>
           <a:p>
             <a:pPr lvl="4"/>
             <a:r>
-              <a:rPr lang="en-US"/>
+              <a:rPr lang="en-US" smtClean="0"/>
               <a:t>Fifth level</a:t>
             </a:r>
+            <a:endParaRPr lang="en-US"/>
           </a:p>
         </p:txBody>
       </p:sp>
@@ -35340,37 +35352,38 @@
           <a:p>
             <a:pPr lvl="0"/>
             <a:r>
-              <a:rPr lang="en-US"/>
+              <a:rPr lang="en-US" smtClean="0"/>
               <a:t>Click to edit Master text styles</a:t>
             </a:r>
           </a:p>
           <a:p>
             <a:pPr lvl="1"/>
             <a:r>
-              <a:rPr lang="en-US"/>
+              <a:rPr lang="en-US" smtClean="0"/>
               <a:t>Second level</a:t>
             </a:r>
           </a:p>
           <a:p>
             <a:pPr lvl="2"/>
             <a:r>
-              <a:rPr lang="en-US"/>
+              <a:rPr lang="en-US" smtClean="0"/>
               <a:t>Third level</a:t>
             </a:r>
           </a:p>
           <a:p>
             <a:pPr lvl="3"/>
             <a:r>
-              <a:rPr lang="en-US"/>
+              <a:rPr lang="en-US" smtClean="0"/>
               <a:t>Fourth level</a:t>
             </a:r>
           </a:p>
           <a:p>
             <a:pPr lvl="4"/>
             <a:r>
-              <a:rPr lang="en-US"/>
+              <a:rPr lang="en-US" smtClean="0"/>
               <a:t>Fifth level</a:t>
             </a:r>
+            <a:endParaRPr lang="en-US"/>
           </a:p>
         </p:txBody>
       </p:sp>
@@ -35391,7 +35404,7 @@
           <a:p>
             <a:fld id="{241EB5C9-1307-BA42-ABA2-0BC069CD8E7F}" type="datetimeFigureOut">
               <a:rPr lang="en-US" smtClean="0"/>
-              <a:t>12/30/2018</a:t>
+              <a:t>4/5/2019</a:t>
             </a:fld>
             <a:endParaRPr lang="en-US"/>
           </a:p>
@@ -35489,9 +35502,10 @@
           </a:lstStyle>
           <a:p>
             <a:r>
-              <a:rPr lang="en-US"/>
+              <a:rPr lang="en-US" smtClean="0"/>
               <a:t>Click to edit Master title style</a:t>
             </a:r>
+            <a:endParaRPr lang="en-US"/>
           </a:p>
         </p:txBody>
       </p:sp>
@@ -35554,7 +35568,7 @@
           <a:p>
             <a:pPr lvl="0"/>
             <a:r>
-              <a:rPr lang="en-US"/>
+              <a:rPr lang="en-US" smtClean="0"/>
               <a:t>Click to edit Master text styles</a:t>
             </a:r>
           </a:p>
@@ -35610,37 +35624,38 @@
           <a:p>
             <a:pPr lvl="0"/>
             <a:r>
-              <a:rPr lang="en-US"/>
+              <a:rPr lang="en-US" smtClean="0"/>
               <a:t>Click to edit Master text styles</a:t>
             </a:r>
           </a:p>
           <a:p>
             <a:pPr lvl="1"/>
             <a:r>
-              <a:rPr lang="en-US"/>
+              <a:rPr lang="en-US" smtClean="0"/>
               <a:t>Second level</a:t>
             </a:r>
           </a:p>
           <a:p>
             <a:pPr lvl="2"/>
             <a:r>
-              <a:rPr lang="en-US"/>
+              <a:rPr lang="en-US" smtClean="0"/>
               <a:t>Third level</a:t>
             </a:r>
           </a:p>
           <a:p>
             <a:pPr lvl="3"/>
             <a:r>
-              <a:rPr lang="en-US"/>
+              <a:rPr lang="en-US" smtClean="0"/>
               <a:t>Fourth level</a:t>
             </a:r>
           </a:p>
           <a:p>
             <a:pPr lvl="4"/>
             <a:r>
-              <a:rPr lang="en-US"/>
+              <a:rPr lang="en-US" smtClean="0"/>
               <a:t>Fifth level</a:t>
             </a:r>
+            <a:endParaRPr lang="en-US"/>
           </a:p>
         </p:txBody>
       </p:sp>
@@ -35703,7 +35718,7 @@
           <a:p>
             <a:pPr lvl="0"/>
             <a:r>
-              <a:rPr lang="en-US"/>
+              <a:rPr lang="en-US" smtClean="0"/>
               <a:t>Click to edit Master text styles</a:t>
             </a:r>
           </a:p>
@@ -35759,37 +35774,38 @@
           <a:p>
             <a:pPr lvl="0"/>
             <a:r>
-              <a:rPr lang="en-US"/>
+              <a:rPr lang="en-US" smtClean="0"/>
               <a:t>Click to edit Master text styles</a:t>
             </a:r>
           </a:p>
           <a:p>
             <a:pPr lvl="1"/>
             <a:r>
-              <a:rPr lang="en-US"/>
+              <a:rPr lang="en-US" smtClean="0"/>
               <a:t>Second level</a:t>
             </a:r>
           </a:p>
           <a:p>
             <a:pPr lvl="2"/>
             <a:r>
-              <a:rPr lang="en-US"/>
+              <a:rPr lang="en-US" smtClean="0"/>
               <a:t>Third level</a:t>
             </a:r>
           </a:p>
           <a:p>
             <a:pPr lvl="3"/>
             <a:r>
-              <a:rPr lang="en-US"/>
+              <a:rPr lang="en-US" smtClean="0"/>
               <a:t>Fourth level</a:t>
             </a:r>
           </a:p>
           <a:p>
             <a:pPr lvl="4"/>
             <a:r>
-              <a:rPr lang="en-US"/>
+              <a:rPr lang="en-US" smtClean="0"/>
               <a:t>Fifth level</a:t>
             </a:r>
+            <a:endParaRPr lang="en-US"/>
           </a:p>
         </p:txBody>
       </p:sp>
@@ -35810,7 +35826,7 @@
           <a:p>
             <a:fld id="{241EB5C9-1307-BA42-ABA2-0BC069CD8E7F}" type="datetimeFigureOut">
               <a:rPr lang="en-US" smtClean="0"/>
-              <a:t>12/30/2018</a:t>
+              <a:t>4/5/2019</a:t>
             </a:fld>
             <a:endParaRPr lang="en-US"/>
           </a:p>
@@ -35904,9 +35920,10 @@
           <a:lstStyle/>
           <a:p>
             <a:r>
-              <a:rPr lang="en-US"/>
+              <a:rPr lang="en-US" smtClean="0"/>
               <a:t>Click to edit Master title style</a:t>
             </a:r>
+            <a:endParaRPr lang="en-US"/>
           </a:p>
         </p:txBody>
       </p:sp>
@@ -35927,7 +35944,7 @@
           <a:p>
             <a:fld id="{241EB5C9-1307-BA42-ABA2-0BC069CD8E7F}" type="datetimeFigureOut">
               <a:rPr lang="en-US" smtClean="0"/>
-              <a:t>12/30/2018</a:t>
+              <a:t>4/5/2019</a:t>
             </a:fld>
             <a:endParaRPr lang="en-US"/>
           </a:p>
@@ -36022,7 +36039,7 @@
           <a:p>
             <a:fld id="{241EB5C9-1307-BA42-ABA2-0BC069CD8E7F}" type="datetimeFigureOut">
               <a:rPr lang="en-US" smtClean="0"/>
-              <a:t>12/30/2018</a:t>
+              <a:t>4/5/2019</a:t>
             </a:fld>
             <a:endParaRPr lang="en-US"/>
           </a:p>
@@ -36125,9 +36142,10 @@
           </a:lstStyle>
           <a:p>
             <a:r>
-              <a:rPr lang="en-US"/>
+              <a:rPr lang="en-US" smtClean="0"/>
               <a:t>Click to edit Master title style</a:t>
             </a:r>
+            <a:endParaRPr lang="en-US"/>
           </a:p>
         </p:txBody>
       </p:sp>
@@ -36181,37 +36199,38 @@
           <a:p>
             <a:pPr lvl="0"/>
             <a:r>
-              <a:rPr lang="en-US"/>
+              <a:rPr lang="en-US" smtClean="0"/>
               <a:t>Click to edit Master text styles</a:t>
             </a:r>
           </a:p>
           <a:p>
             <a:pPr lvl="1"/>
             <a:r>
-              <a:rPr lang="en-US"/>
+              <a:rPr lang="en-US" smtClean="0"/>
               <a:t>Second level</a:t>
             </a:r>
           </a:p>
           <a:p>
             <a:pPr lvl="2"/>
             <a:r>
-              <a:rPr lang="en-US"/>
+              <a:rPr lang="en-US" smtClean="0"/>
               <a:t>Third level</a:t>
             </a:r>
           </a:p>
           <a:p>
             <a:pPr lvl="3"/>
             <a:r>
-              <a:rPr lang="en-US"/>
+              <a:rPr lang="en-US" smtClean="0"/>
               <a:t>Fourth level</a:t>
             </a:r>
           </a:p>
           <a:p>
             <a:pPr lvl="4"/>
             <a:r>
-              <a:rPr lang="en-US"/>
+              <a:rPr lang="en-US" smtClean="0"/>
               <a:t>Fifth level</a:t>
             </a:r>
+            <a:endParaRPr lang="en-US"/>
           </a:p>
         </p:txBody>
       </p:sp>
@@ -36274,7 +36293,7 @@
           <a:p>
             <a:pPr lvl="0"/>
             <a:r>
-              <a:rPr lang="en-US"/>
+              <a:rPr lang="en-US" smtClean="0"/>
               <a:t>Click to edit Master text styles</a:t>
             </a:r>
           </a:p>
@@ -36297,7 +36316,7 @@
           <a:p>
             <a:fld id="{241EB5C9-1307-BA42-ABA2-0BC069CD8E7F}" type="datetimeFigureOut">
               <a:rPr lang="en-US" smtClean="0"/>
-              <a:t>12/30/2018</a:t>
+              <a:t>4/5/2019</a:t>
             </a:fld>
             <a:endParaRPr lang="en-US"/>
           </a:p>
@@ -36400,9 +36419,10 @@
           </a:lstStyle>
           <a:p>
             <a:r>
-              <a:rPr lang="en-US"/>
+              <a:rPr lang="en-US" smtClean="0"/>
               <a:t>Click to edit Master title style</a:t>
             </a:r>
+            <a:endParaRPr lang="en-US"/>
           </a:p>
         </p:txBody>
       </p:sp>
@@ -36526,7 +36546,7 @@
           <a:p>
             <a:pPr lvl="0"/>
             <a:r>
-              <a:rPr lang="en-US"/>
+              <a:rPr lang="en-US" smtClean="0"/>
               <a:t>Click to edit Master text styles</a:t>
             </a:r>
           </a:p>
@@ -36549,7 +36569,7 @@
           <a:p>
             <a:fld id="{241EB5C9-1307-BA42-ABA2-0BC069CD8E7F}" type="datetimeFigureOut">
               <a:rPr lang="en-US" smtClean="0"/>
-              <a:t>12/30/2018</a:t>
+              <a:t>4/5/2019</a:t>
             </a:fld>
             <a:endParaRPr lang="en-US"/>
           </a:p>
@@ -36658,9 +36678,10 @@
           <a:lstStyle/>
           <a:p>
             <a:r>
-              <a:rPr lang="en-US"/>
+              <a:rPr lang="en-US" smtClean="0"/>
               <a:t>Click to edit Master title style</a:t>
             </a:r>
+            <a:endParaRPr lang="en-US"/>
           </a:p>
         </p:txBody>
       </p:sp>
@@ -36691,37 +36712,38 @@
           <a:p>
             <a:pPr lvl="0"/>
             <a:r>
-              <a:rPr lang="en-US"/>
+              <a:rPr lang="en-US" smtClean="0"/>
               <a:t>Click to edit Master text styles</a:t>
             </a:r>
           </a:p>
           <a:p>
             <a:pPr lvl="1"/>
             <a:r>
-              <a:rPr lang="en-US"/>
+              <a:rPr lang="en-US" smtClean="0"/>
               <a:t>Second level</a:t>
             </a:r>
           </a:p>
           <a:p>
             <a:pPr lvl="2"/>
             <a:r>
-              <a:rPr lang="en-US"/>
+              <a:rPr lang="en-US" smtClean="0"/>
               <a:t>Third level</a:t>
             </a:r>
           </a:p>
           <a:p>
             <a:pPr lvl="3"/>
             <a:r>
-              <a:rPr lang="en-US"/>
+              <a:rPr lang="en-US" smtClean="0"/>
               <a:t>Fourth level</a:t>
             </a:r>
           </a:p>
           <a:p>
             <a:pPr lvl="4"/>
             <a:r>
-              <a:rPr lang="en-US"/>
+              <a:rPr lang="en-US" smtClean="0"/>
               <a:t>Fifth level</a:t>
             </a:r>
+            <a:endParaRPr lang="en-US"/>
           </a:p>
         </p:txBody>
       </p:sp>
@@ -36760,7 +36782,7 @@
           <a:p>
             <a:fld id="{241EB5C9-1307-BA42-ABA2-0BC069CD8E7F}" type="datetimeFigureOut">
               <a:rPr lang="en-US" smtClean="0"/>
-              <a:t>12/30/2018</a:t>
+              <a:t>4/5/2019</a:t>
             </a:fld>
             <a:endParaRPr lang="en-US"/>
           </a:p>
@@ -37204,7 +37226,7 @@
             <a:spLocks noGrp="1"/>
           </p:cNvSpPr>
           <p:nvPr>
-            <p:ph type="subTitle" idx="1"/>
+            <p:ph idx="1" type="subTitle"/>
           </p:nvPr>
         </p:nvSpPr>
         <p:spPr>
@@ -39987,11 +40009,11 @@
           <a:bodyPr/>
           <a:lstStyle/>
           <a:p>
-            <a:pPr lvl="0" marL="1270000" indent="0">
+            <a:pPr lvl="0" indent="0">
               <a:buNone/>
             </a:pPr>
             <a:r>
-              <a:rPr sz="1800">
+              <a:rPr>
                 <a:latin typeface="Courier"/>
               </a:rPr>
               <a:t>R E: O1 X O2   O3
@@ -40094,11 +40116,11 @@
           <a:bodyPr/>
           <a:lstStyle/>
           <a:p>
-            <a:pPr lvl="0" marL="1270000" indent="0">
+            <a:pPr lvl="0" indent="0">
               <a:buNone/>
             </a:pPr>
             <a:r>
-              <a:rPr sz="1800">
+              <a:rPr>
                 <a:latin typeface="Courier"/>
               </a:rPr>
               <a:t>NR E: X O</a:t>
@@ -40222,11 +40244,11 @@
           <a:bodyPr/>
           <a:lstStyle/>
           <a:p>
-            <a:pPr lvl="0" marL="1270000" indent="0">
+            <a:pPr lvl="0" indent="0">
               <a:buNone/>
             </a:pPr>
             <a:r>
-              <a:rPr sz="1800">
+              <a:rPr>
                 <a:latin typeface="Courier"/>
               </a:rPr>
               <a:t>NR E: O1 X O2</a:t>
@@ -40531,11 +40553,11 @@
           <a:bodyPr/>
           <a:lstStyle/>
           <a:p>
-            <a:pPr lvl="0" marL="1270000" indent="0">
+            <a:pPr lvl="0" indent="0">
               <a:buNone/>
             </a:pPr>
             <a:r>
-              <a:rPr sz="1800">
+              <a:rPr>
                 <a:latin typeface="Courier"/>
               </a:rPr>
               <a:t>NR E: X O
@@ -40546,7 +40568,7 @@
             <a:pPr lvl="1"/>
             <a:r>
               <a:rPr/>
-              <a:t>Nonrandomized comparison</a:t>
+              <a:t>Non-randomized comparison</a:t>
             </a:r>
           </a:p>
           <a:p>
@@ -40660,11 +40682,11 @@
           <a:bodyPr/>
           <a:lstStyle/>
           <a:p>
-            <a:pPr lvl="0" marL="1270000" indent="0">
+            <a:pPr lvl="0" indent="0">
               <a:buNone/>
             </a:pPr>
             <a:r>
-              <a:rPr sz="1800">
+              <a:rPr>
                 <a:latin typeface="Courier"/>
               </a:rPr>
               <a:t>NR E: O1 X O2
@@ -40900,11 +40922,11 @@
           <a:bodyPr/>
           <a:lstStyle/>
           <a:p>
-            <a:pPr lvl="0" marL="1270000" indent="0">
+            <a:pPr lvl="0" indent="0">
               <a:buNone/>
             </a:pPr>
             <a:r>
-              <a:rPr sz="1800">
+              <a:rPr>
                 <a:latin typeface="Courier"/>
               </a:rPr>
               <a:t>NR E: O1 O2 O3 X O4 O5 O6</a:t>
@@ -41153,11 +41175,11 @@
           <a:bodyPr/>
           <a:lstStyle/>
           <a:p>
-            <a:pPr lvl="0" marL="1270000" indent="0">
+            <a:pPr lvl="0" indent="0">
               <a:buNone/>
             </a:pPr>
             <a:r>
-              <a:rPr sz="1800">
+              <a:rPr>
                 <a:latin typeface="Courier"/>
               </a:rPr>
               <a:t>NR E: O1 O2 X1 O3 O4 O5 X2 O6 O7 O8 X3 O9 O10</a:t>
@@ -41382,33 +41404,33 @@
           <a:bodyPr/>
           <a:lstStyle/>
           <a:p>
-            <a:pPr lvl="0" marL="1270000" indent="0">
+            <a:pPr lvl="0" indent="0">
               <a:buNone/>
             </a:pPr>
             <a:r>
-              <a:rPr sz="1800">
+              <a:rPr>
                 <a:latin typeface="Courier"/>
               </a:rPr>
               <a:t>NR E1: O1 O2 X O3 O4 O5   O6 O7 O8   O9 O10</a:t>
             </a:r>
           </a:p>
           <a:p>
-            <a:pPr lvl="0" marL="1270000" indent="0">
+            <a:pPr lvl="0" indent="0">
               <a:buNone/>
             </a:pPr>
             <a:r>
-              <a:rPr sz="1800">
+              <a:rPr>
                 <a:latin typeface="Courier"/>
               </a:rPr>
               <a:t>NR E2: O1 O2   O3 O4 O5 X O6 O7 O8   O9 O10</a:t>
             </a:r>
           </a:p>
           <a:p>
-            <a:pPr lvl="0" marL="1270000" indent="0">
+            <a:pPr lvl="0" indent="0">
               <a:buNone/>
             </a:pPr>
             <a:r>
-              <a:rPr sz="1800">
+              <a:rPr>
                 <a:latin typeface="Courier"/>
               </a:rPr>
               <a:t>NR E3: O1 O2   O3 O4 O5   O6 O7 O8 X O9 O10</a:t>
@@ -41871,11 +41893,11 @@
           <a:bodyPr/>
           <a:lstStyle/>
           <a:p>
-            <a:pPr lvl="0" marL="1270000" indent="0">
+            <a:pPr lvl="0" indent="0">
               <a:buNone/>
             </a:pPr>
             <a:r>
-              <a:rPr sz="1800">
+              <a:rPr>
                 <a:latin typeface="Courier"/>
               </a:rPr>
               <a:t>NR E: O1 X O2 -X O3</a:t>

</xml_diff>